<commit_message>
Fixed issue with domains that aren't subdomains (have two . in them
</commit_message>
<xml_diff>
--- a/Docs/Tartansync Test State Chart.pptx
+++ b/Docs/Tartansync Test State Chart.pptx
@@ -5,12 +5,13 @@
     <p:sldMasterId id="2147483648" r:id="rId1"/>
   </p:sldMasterIdLst>
   <p:notesMasterIdLst>
-    <p:notesMasterId r:id="rId5"/>
+    <p:notesMasterId r:id="rId6"/>
   </p:notesMasterIdLst>
   <p:sldIdLst>
     <p:sldId id="256" r:id="rId2"/>
     <p:sldId id="257" r:id="rId3"/>
     <p:sldId id="258" r:id="rId4"/>
+    <p:sldId id="259" r:id="rId5"/>
   </p:sldIdLst>
   <p:sldSz cx="12192000" cy="6858000"/>
   <p:notesSz cx="6858000" cy="9144000"/>
@@ -13825,6 +13826,36 @@
     <p:extLst>
       <p:ext uri="{BB962C8B-B14F-4D97-AF65-F5344CB8AC3E}">
         <p14:creationId xmlns:p14="http://schemas.microsoft.com/office/powerpoint/2010/main" val="3192435848"/>
+      </p:ext>
+    </p:extLst>
+  </p:cSld>
+  <p:clrMapOvr>
+    <a:masterClrMapping/>
+  </p:clrMapOvr>
+</p:sld>
+</file>
+
+<file path=ppt/slides/slide4.xml><?xml version="1.0" encoding="utf-8"?>
+<p:sld xmlns:a="http://schemas.openxmlformats.org/drawingml/2006/main" xmlns:r="http://schemas.openxmlformats.org/officeDocument/2006/relationships" xmlns:p="http://schemas.openxmlformats.org/presentationml/2006/main">
+  <p:cSld>
+    <p:spTree>
+      <p:nvGrpSpPr>
+        <p:cNvPr id="1" name=""/>
+        <p:cNvGrpSpPr/>
+        <p:nvPr/>
+      </p:nvGrpSpPr>
+      <p:grpSpPr>
+        <a:xfrm>
+          <a:off x="0" y="0"/>
+          <a:ext cx="0" cy="0"/>
+          <a:chOff x="0" y="0"/>
+          <a:chExt cx="0" cy="0"/>
+        </a:xfrm>
+      </p:grpSpPr>
+    </p:spTree>
+    <p:extLst>
+      <p:ext uri="{BB962C8B-B14F-4D97-AF65-F5344CB8AC3E}">
+        <p14:creationId xmlns:p14="http://schemas.microsoft.com/office/powerpoint/2010/main" val="3043396051"/>
       </p:ext>
     </p:extLst>
   </p:cSld>

</xml_diff>